<commit_message>
update oop session 01
</commit_message>
<xml_diff>
--- a/oop/oop-01.pptx
+++ b/oop/oop-01.pptx
@@ -5,11 +5,16 @@
     <p:sldMasterId id="2147483705" r:id="rId1"/>
   </p:sldMasterIdLst>
   <p:notesMasterIdLst>
-    <p:notesMasterId r:id="rId4"/>
+    <p:notesMasterId r:id="rId9"/>
   </p:notesMasterIdLst>
   <p:sldIdLst>
     <p:sldId id="259" r:id="rId2"/>
     <p:sldId id="295" r:id="rId3"/>
+    <p:sldId id="296" r:id="rId4"/>
+    <p:sldId id="300" r:id="rId5"/>
+    <p:sldId id="297" r:id="rId6"/>
+    <p:sldId id="298" r:id="rId7"/>
+    <p:sldId id="299" r:id="rId8"/>
   </p:sldIdLst>
   <p:sldSz cx="12192000" cy="6858000"/>
   <p:notesSz cx="6858000" cy="9144000"/>
@@ -463,6 +468,184 @@
     </a:lvl9pPr>
   </p:notesStyle>
 </p:notesMaster>
+</file>
+
+<file path=ppt/notesSlides/notesSlide1.xml><?xml version="1.0" encoding="utf-8"?>
+<p:notes xmlns:a="http://schemas.openxmlformats.org/drawingml/2006/main" xmlns:r="http://schemas.openxmlformats.org/officeDocument/2006/relationships" xmlns:p="http://schemas.openxmlformats.org/presentationml/2006/main">
+  <p:cSld>
+    <p:spTree>
+      <p:nvGrpSpPr>
+        <p:cNvPr id="1" name=""/>
+        <p:cNvGrpSpPr/>
+        <p:nvPr/>
+      </p:nvGrpSpPr>
+      <p:grpSpPr>
+        <a:xfrm>
+          <a:off x="0" y="0"/>
+          <a:ext cx="0" cy="0"/>
+          <a:chOff x="0" y="0"/>
+          <a:chExt cx="0" cy="0"/>
+        </a:xfrm>
+      </p:grpSpPr>
+      <p:sp>
+        <p:nvSpPr>
+          <p:cNvPr id="2" name="Slide Image Placeholder 1"/>
+          <p:cNvSpPr>
+            <a:spLocks noGrp="1" noRot="1" noChangeAspect="1"/>
+          </p:cNvSpPr>
+          <p:nvPr>
+            <p:ph type="sldImg"/>
+          </p:nvPr>
+        </p:nvSpPr>
+        <p:spPr/>
+      </p:sp>
+      <p:sp>
+        <p:nvSpPr>
+          <p:cNvPr id="3" name="Notes Placeholder 2"/>
+          <p:cNvSpPr>
+            <a:spLocks noGrp="1"/>
+          </p:cNvSpPr>
+          <p:nvPr>
+            <p:ph type="body" idx="1"/>
+          </p:nvPr>
+        </p:nvSpPr>
+        <p:spPr/>
+        <p:txBody>
+          <a:bodyPr/>
+          <a:lstStyle/>
+          <a:p>
+            <a:r>
+              <a:rPr lang="en-US" dirty="0"/>
+              <a:t>https://www.youtube.com/watch?v=fsVL_xrYO0w</a:t>
+            </a:r>
+            <a:endParaRPr lang="fa-IR" dirty="0"/>
+          </a:p>
+        </p:txBody>
+      </p:sp>
+      <p:sp>
+        <p:nvSpPr>
+          <p:cNvPr id="4" name="Slide Number Placeholder 3"/>
+          <p:cNvSpPr>
+            <a:spLocks noGrp="1"/>
+          </p:cNvSpPr>
+          <p:nvPr>
+            <p:ph type="sldNum" sz="quarter" idx="5"/>
+          </p:nvPr>
+        </p:nvSpPr>
+        <p:spPr/>
+        <p:txBody>
+          <a:bodyPr/>
+          <a:lstStyle/>
+          <a:p>
+            <a:fld id="{0FE84E6F-3671-472C-BE6F-A37BC298F4AB}" type="slidenum">
+              <a:rPr lang="en-US" smtClean="0"/>
+              <a:t>4</a:t>
+            </a:fld>
+            <a:endParaRPr lang="en-US"/>
+          </a:p>
+        </p:txBody>
+      </p:sp>
+    </p:spTree>
+    <p:extLst>
+      <p:ext uri="{BB962C8B-B14F-4D97-AF65-F5344CB8AC3E}">
+        <p14:creationId xmlns:p14="http://schemas.microsoft.com/office/powerpoint/2010/main" val="33574042"/>
+      </p:ext>
+    </p:extLst>
+  </p:cSld>
+  <p:clrMapOvr>
+    <a:masterClrMapping/>
+  </p:clrMapOvr>
+</p:notes>
+</file>
+
+<file path=ppt/notesSlides/notesSlide2.xml><?xml version="1.0" encoding="utf-8"?>
+<p:notes xmlns:a="http://schemas.openxmlformats.org/drawingml/2006/main" xmlns:r="http://schemas.openxmlformats.org/officeDocument/2006/relationships" xmlns:p="http://schemas.openxmlformats.org/presentationml/2006/main">
+  <p:cSld>
+    <p:spTree>
+      <p:nvGrpSpPr>
+        <p:cNvPr id="1" name=""/>
+        <p:cNvGrpSpPr/>
+        <p:nvPr/>
+      </p:nvGrpSpPr>
+      <p:grpSpPr>
+        <a:xfrm>
+          <a:off x="0" y="0"/>
+          <a:ext cx="0" cy="0"/>
+          <a:chOff x="0" y="0"/>
+          <a:chExt cx="0" cy="0"/>
+        </a:xfrm>
+      </p:grpSpPr>
+      <p:sp>
+        <p:nvSpPr>
+          <p:cNvPr id="2" name="Slide Image Placeholder 1"/>
+          <p:cNvSpPr>
+            <a:spLocks noGrp="1" noRot="1" noChangeAspect="1"/>
+          </p:cNvSpPr>
+          <p:nvPr>
+            <p:ph type="sldImg"/>
+          </p:nvPr>
+        </p:nvSpPr>
+        <p:spPr/>
+      </p:sp>
+      <p:sp>
+        <p:nvSpPr>
+          <p:cNvPr id="3" name="Notes Placeholder 2"/>
+          <p:cNvSpPr>
+            <a:spLocks noGrp="1"/>
+          </p:cNvSpPr>
+          <p:nvPr>
+            <p:ph type="body" idx="1"/>
+          </p:nvPr>
+        </p:nvSpPr>
+        <p:spPr/>
+        <p:txBody>
+          <a:bodyPr/>
+          <a:lstStyle/>
+          <a:p>
+            <a:r>
+              <a:rPr lang="en-US" dirty="0"/>
+              <a:t>https://felixgerschau.com/javascript-memory-management/</a:t>
+            </a:r>
+          </a:p>
+          <a:p>
+            <a:endParaRPr lang="fa-IR" dirty="0"/>
+          </a:p>
+        </p:txBody>
+      </p:sp>
+      <p:sp>
+        <p:nvSpPr>
+          <p:cNvPr id="4" name="Slide Number Placeholder 3"/>
+          <p:cNvSpPr>
+            <a:spLocks noGrp="1"/>
+          </p:cNvSpPr>
+          <p:nvPr>
+            <p:ph type="sldNum" sz="quarter" idx="5"/>
+          </p:nvPr>
+        </p:nvSpPr>
+        <p:spPr/>
+        <p:txBody>
+          <a:bodyPr/>
+          <a:lstStyle/>
+          <a:p>
+            <a:fld id="{0FE84E6F-3671-472C-BE6F-A37BC298F4AB}" type="slidenum">
+              <a:rPr lang="en-US" smtClean="0"/>
+              <a:t>5</a:t>
+            </a:fld>
+            <a:endParaRPr lang="en-US"/>
+          </a:p>
+        </p:txBody>
+      </p:sp>
+    </p:spTree>
+    <p:extLst>
+      <p:ext uri="{BB962C8B-B14F-4D97-AF65-F5344CB8AC3E}">
+        <p14:creationId xmlns:p14="http://schemas.microsoft.com/office/powerpoint/2010/main" val="123819857"/>
+      </p:ext>
+    </p:extLst>
+  </p:cSld>
+  <p:clrMapOvr>
+    <a:masterClrMapping/>
+  </p:clrMapOvr>
+</p:notes>
 </file>
 
 <file path=ppt/slideLayouts/slideLayout1.xml><?xml version="1.0" encoding="utf-8"?>
@@ -6743,7 +6926,7 @@
         <p:spPr/>
         <p:txBody>
           <a:bodyPr>
-            <a:normAutofit/>
+            <a:normAutofit lnSpcReduction="10000"/>
           </a:bodyPr>
           <a:lstStyle/>
           <a:p>
@@ -6827,6 +7010,19 @@
             </a:r>
           </a:p>
           <a:p>
+            <a:pPr lvl="1"/>
+            <a:r>
+              <a:rPr lang="en-US" dirty="0">
+                <a:solidFill>
+                  <a:schemeClr val="tx1">
+                    <a:lumMod val="50000"/>
+                  </a:schemeClr>
+                </a:solidFill>
+              </a:rPr>
+              <a:t>Composition vs inheritance</a:t>
+            </a:r>
+          </a:p>
+          <a:p>
             <a:r>
               <a:rPr lang="en-US" dirty="0">
                 <a:solidFill>
@@ -6911,6 +7107,853 @@
     <p:extLst>
       <p:ext uri="{BB962C8B-B14F-4D97-AF65-F5344CB8AC3E}">
         <p14:creationId xmlns:p14="http://schemas.microsoft.com/office/powerpoint/2010/main" val="1628682045"/>
+      </p:ext>
+    </p:extLst>
+  </p:cSld>
+  <p:clrMapOvr>
+    <a:masterClrMapping/>
+  </p:clrMapOvr>
+</p:sld>
+</file>
+
+<file path=ppt/slides/slide3.xml><?xml version="1.0" encoding="utf-8"?>
+<p:sld xmlns:a="http://schemas.openxmlformats.org/drawingml/2006/main" xmlns:r="http://schemas.openxmlformats.org/officeDocument/2006/relationships" xmlns:p="http://schemas.openxmlformats.org/presentationml/2006/main">
+  <p:cSld>
+    <p:spTree>
+      <p:nvGrpSpPr>
+        <p:cNvPr id="1" name=""/>
+        <p:cNvGrpSpPr/>
+        <p:nvPr/>
+      </p:nvGrpSpPr>
+      <p:grpSpPr>
+        <a:xfrm>
+          <a:off x="0" y="0"/>
+          <a:ext cx="0" cy="0"/>
+          <a:chOff x="0" y="0"/>
+          <a:chExt cx="0" cy="0"/>
+        </a:xfrm>
+      </p:grpSpPr>
+      <p:sp>
+        <p:nvSpPr>
+          <p:cNvPr id="2" name="Title 1">
+            <a:extLst>
+              <a:ext uri="{FF2B5EF4-FFF2-40B4-BE49-F238E27FC236}">
+                <a16:creationId xmlns:a16="http://schemas.microsoft.com/office/drawing/2014/main" id="{ECAE7D2A-8D83-4817-A49C-6CE612D0582C}"/>
+              </a:ext>
+            </a:extLst>
+          </p:cNvPr>
+          <p:cNvSpPr>
+            <a:spLocks noGrp="1"/>
+          </p:cNvSpPr>
+          <p:nvPr>
+            <p:ph type="title"/>
+          </p:nvPr>
+        </p:nvSpPr>
+        <p:spPr/>
+        <p:txBody>
+          <a:bodyPr/>
+          <a:lstStyle/>
+          <a:p>
+            <a:r>
+              <a:rPr lang="en-US" dirty="0"/>
+              <a:t>What is OOP?</a:t>
+            </a:r>
+            <a:endParaRPr lang="fa-IR" dirty="0"/>
+          </a:p>
+        </p:txBody>
+      </p:sp>
+      <p:sp>
+        <p:nvSpPr>
+          <p:cNvPr id="3" name="Content Placeholder 2">
+            <a:extLst>
+              <a:ext uri="{FF2B5EF4-FFF2-40B4-BE49-F238E27FC236}">
+                <a16:creationId xmlns:a16="http://schemas.microsoft.com/office/drawing/2014/main" id="{6EF097F0-6DA3-41D1-BE3D-7C528AECD58B}"/>
+              </a:ext>
+            </a:extLst>
+          </p:cNvPr>
+          <p:cNvSpPr>
+            <a:spLocks noGrp="1"/>
+          </p:cNvSpPr>
+          <p:nvPr>
+            <p:ph idx="1"/>
+          </p:nvPr>
+        </p:nvSpPr>
+        <p:spPr/>
+        <p:txBody>
+          <a:bodyPr/>
+          <a:lstStyle/>
+          <a:p>
+            <a:r>
+              <a:rPr lang="en-US" dirty="0"/>
+              <a:t>Suppose we have a problem about a game:</a:t>
+            </a:r>
+          </a:p>
+          <a:p>
+            <a:pPr lvl="1"/>
+            <a:r>
+              <a:rPr lang="en-US" dirty="0"/>
+              <a:t>Each character has some ability.</a:t>
+            </a:r>
+          </a:p>
+          <a:p>
+            <a:pPr lvl="2"/>
+            <a:r>
+              <a:rPr lang="en-US" dirty="0"/>
+              <a:t>Move</a:t>
+            </a:r>
+          </a:p>
+          <a:p>
+            <a:pPr lvl="1"/>
+            <a:r>
+              <a:rPr lang="en-US" dirty="0"/>
+              <a:t>There is two approach to solve the problem</a:t>
+            </a:r>
+          </a:p>
+          <a:p>
+            <a:pPr lvl="2"/>
+            <a:r>
+              <a:rPr lang="en-US" dirty="0"/>
+              <a:t>Through functions</a:t>
+            </a:r>
+          </a:p>
+          <a:p>
+            <a:pPr lvl="2"/>
+            <a:r>
+              <a:rPr lang="en-US" dirty="0"/>
+              <a:t>Through classes</a:t>
+            </a:r>
+          </a:p>
+          <a:p>
+            <a:pPr lvl="1"/>
+            <a:endParaRPr lang="en-US" dirty="0"/>
+          </a:p>
+        </p:txBody>
+      </p:sp>
+      <p:sp>
+        <p:nvSpPr>
+          <p:cNvPr id="4" name="Footer Placeholder 3">
+            <a:extLst>
+              <a:ext uri="{FF2B5EF4-FFF2-40B4-BE49-F238E27FC236}">
+                <a16:creationId xmlns:a16="http://schemas.microsoft.com/office/drawing/2014/main" id="{3D42DADF-FCD9-4162-8A11-889BF2624539}"/>
+              </a:ext>
+            </a:extLst>
+          </p:cNvPr>
+          <p:cNvSpPr>
+            <a:spLocks noGrp="1"/>
+          </p:cNvSpPr>
+          <p:nvPr>
+            <p:ph type="ftr" sz="quarter" idx="11"/>
+          </p:nvPr>
+        </p:nvSpPr>
+        <p:spPr/>
+        <p:txBody>
+          <a:bodyPr/>
+          <a:lstStyle/>
+          <a:p>
+            <a:r>
+              <a:rPr lang="en-US"/>
+              <a:t>Nodejs Basics</a:t>
+            </a:r>
+            <a:endParaRPr lang="en-US" dirty="0"/>
+          </a:p>
+        </p:txBody>
+      </p:sp>
+      <p:sp>
+        <p:nvSpPr>
+          <p:cNvPr id="5" name="Slide Number Placeholder 4">
+            <a:extLst>
+              <a:ext uri="{FF2B5EF4-FFF2-40B4-BE49-F238E27FC236}">
+                <a16:creationId xmlns:a16="http://schemas.microsoft.com/office/drawing/2014/main" id="{B374DFE0-284A-4BBF-8FCB-450761ED468D}"/>
+              </a:ext>
+            </a:extLst>
+          </p:cNvPr>
+          <p:cNvSpPr>
+            <a:spLocks noGrp="1"/>
+          </p:cNvSpPr>
+          <p:nvPr>
+            <p:ph type="sldNum" sz="quarter" idx="12"/>
+          </p:nvPr>
+        </p:nvSpPr>
+        <p:spPr/>
+        <p:txBody>
+          <a:bodyPr/>
+          <a:lstStyle/>
+          <a:p>
+            <a:fld id="{3A98EE3D-8CD1-4C3F-BD1C-C98C9596463C}" type="slidenum">
+              <a:rPr lang="en-US" smtClean="0"/>
+              <a:t>3</a:t>
+            </a:fld>
+            <a:endParaRPr lang="en-US" dirty="0"/>
+          </a:p>
+        </p:txBody>
+      </p:sp>
+    </p:spTree>
+    <p:extLst>
+      <p:ext uri="{BB962C8B-B14F-4D97-AF65-F5344CB8AC3E}">
+        <p14:creationId xmlns:p14="http://schemas.microsoft.com/office/powerpoint/2010/main" val="3649783278"/>
+      </p:ext>
+    </p:extLst>
+  </p:cSld>
+  <p:clrMapOvr>
+    <a:masterClrMapping/>
+  </p:clrMapOvr>
+</p:sld>
+</file>
+
+<file path=ppt/slides/slide4.xml><?xml version="1.0" encoding="utf-8"?>
+<p:sld xmlns:a="http://schemas.openxmlformats.org/drawingml/2006/main" xmlns:r="http://schemas.openxmlformats.org/officeDocument/2006/relationships" xmlns:p="http://schemas.openxmlformats.org/presentationml/2006/main">
+  <p:cSld>
+    <p:spTree>
+      <p:nvGrpSpPr>
+        <p:cNvPr id="1" name=""/>
+        <p:cNvGrpSpPr/>
+        <p:nvPr/>
+      </p:nvGrpSpPr>
+      <p:grpSpPr>
+        <a:xfrm>
+          <a:off x="0" y="0"/>
+          <a:ext cx="0" cy="0"/>
+          <a:chOff x="0" y="0"/>
+          <a:chExt cx="0" cy="0"/>
+        </a:xfrm>
+      </p:grpSpPr>
+      <p:sp>
+        <p:nvSpPr>
+          <p:cNvPr id="2" name="Title 1">
+            <a:extLst>
+              <a:ext uri="{FF2B5EF4-FFF2-40B4-BE49-F238E27FC236}">
+                <a16:creationId xmlns:a16="http://schemas.microsoft.com/office/drawing/2014/main" id="{E34B3BED-193A-490D-AB98-6AD2CD450B69}"/>
+              </a:ext>
+            </a:extLst>
+          </p:cNvPr>
+          <p:cNvSpPr>
+            <a:spLocks noGrp="1"/>
+          </p:cNvSpPr>
+          <p:nvPr>
+            <p:ph type="title"/>
+          </p:nvPr>
+        </p:nvSpPr>
+        <p:spPr/>
+        <p:txBody>
+          <a:bodyPr/>
+          <a:lstStyle/>
+          <a:p>
+            <a:r>
+              <a:rPr lang="en-US" dirty="0"/>
+              <a:t>Demo</a:t>
+            </a:r>
+            <a:endParaRPr lang="fa-IR" dirty="0"/>
+          </a:p>
+        </p:txBody>
+      </p:sp>
+      <p:sp>
+        <p:nvSpPr>
+          <p:cNvPr id="3" name="Content Placeholder 2">
+            <a:extLst>
+              <a:ext uri="{FF2B5EF4-FFF2-40B4-BE49-F238E27FC236}">
+                <a16:creationId xmlns:a16="http://schemas.microsoft.com/office/drawing/2014/main" id="{B9B5114C-1855-4DB1-8ADD-61866D5037A4}"/>
+              </a:ext>
+            </a:extLst>
+          </p:cNvPr>
+          <p:cNvSpPr>
+            <a:spLocks noGrp="1"/>
+          </p:cNvSpPr>
+          <p:nvPr>
+            <p:ph idx="1"/>
+          </p:nvPr>
+        </p:nvSpPr>
+        <p:spPr/>
+        <p:txBody>
+          <a:bodyPr/>
+          <a:lstStyle/>
+          <a:p>
+            <a:r>
+              <a:rPr lang="en-US" dirty="0"/>
+              <a:t>Functional programming</a:t>
+            </a:r>
+          </a:p>
+          <a:p>
+            <a:pPr lvl="1"/>
+            <a:r>
+              <a:rPr lang="en-US" dirty="0"/>
+              <a:t>const </a:t>
+            </a:r>
+            <a:r>
+              <a:rPr lang="en-US" dirty="0" err="1"/>
+              <a:t>addEmoji</a:t>
+            </a:r>
+            <a:r>
+              <a:rPr lang="en-US" dirty="0"/>
+              <a:t> = (</a:t>
+            </a:r>
+            <a:r>
+              <a:rPr lang="en-US" dirty="0" err="1"/>
+              <a:t>val</a:t>
+            </a:r>
+            <a:r>
+              <a:rPr lang="en-US" dirty="0"/>
+              <a:t>) =&gt; </a:t>
+            </a:r>
+            <a:r>
+              <a:rPr lang="en-US" dirty="0" err="1"/>
+              <a:t>toString</a:t>
+            </a:r>
+            <a:r>
+              <a:rPr lang="en-US" dirty="0"/>
+              <a:t>(</a:t>
+            </a:r>
+            <a:r>
+              <a:rPr lang="en-US" dirty="0" err="1"/>
+              <a:t>val</a:t>
+            </a:r>
+            <a:r>
+              <a:rPr lang="en-US" dirty="0"/>
+              <a:t>) + ‘</a:t>
+            </a:r>
+            <a:r>
+              <a:rPr lang="en-US" dirty="0">
+                <a:sym typeface="Wingdings" panose="05000000000000000000" pitchFamily="2" charset="2"/>
+              </a:rPr>
+              <a:t></a:t>
+            </a:r>
+            <a:r>
+              <a:rPr lang="en-US" dirty="0"/>
+              <a:t>’;</a:t>
+            </a:r>
+          </a:p>
+          <a:p>
+            <a:pPr lvl="1"/>
+            <a:r>
+              <a:rPr lang="en-US" dirty="0"/>
+              <a:t>const </a:t>
+            </a:r>
+            <a:r>
+              <a:rPr lang="en-US" dirty="0" err="1"/>
+              <a:t>appendEmoji</a:t>
+            </a:r>
+            <a:r>
+              <a:rPr lang="en-US" dirty="0"/>
+              <a:t> = (fixed) =&gt; (dynamic) =&gt; fixed + dynamic;</a:t>
+            </a:r>
+          </a:p>
+          <a:p>
+            <a:pPr lvl="1"/>
+            <a:r>
+              <a:rPr lang="en-US" dirty="0"/>
+              <a:t>const happy = </a:t>
+            </a:r>
+            <a:r>
+              <a:rPr lang="en-US" dirty="0" err="1"/>
+              <a:t>appendEmoji</a:t>
+            </a:r>
+            <a:r>
+              <a:rPr lang="en-US" dirty="0"/>
+              <a:t>(‘</a:t>
+            </a:r>
+            <a:r>
+              <a:rPr lang="en-US" dirty="0">
+                <a:sym typeface="Wingdings" panose="05000000000000000000" pitchFamily="2" charset="2"/>
+              </a:rPr>
+              <a:t>’);</a:t>
+            </a:r>
+          </a:p>
+          <a:p>
+            <a:pPr lvl="1"/>
+            <a:r>
+              <a:rPr lang="en-US" dirty="0">
+                <a:sym typeface="Wingdings" panose="05000000000000000000" pitchFamily="2" charset="2"/>
+              </a:rPr>
+              <a:t>console.log(happy(`I’m`)); // I’m </a:t>
+            </a:r>
+            <a:endParaRPr lang="en-US" dirty="0"/>
+          </a:p>
+        </p:txBody>
+      </p:sp>
+      <p:sp>
+        <p:nvSpPr>
+          <p:cNvPr id="4" name="Footer Placeholder 3">
+            <a:extLst>
+              <a:ext uri="{FF2B5EF4-FFF2-40B4-BE49-F238E27FC236}">
+                <a16:creationId xmlns:a16="http://schemas.microsoft.com/office/drawing/2014/main" id="{4A9ED0C8-799F-4377-8B8B-E7542B320E47}"/>
+              </a:ext>
+            </a:extLst>
+          </p:cNvPr>
+          <p:cNvSpPr>
+            <a:spLocks noGrp="1"/>
+          </p:cNvSpPr>
+          <p:nvPr>
+            <p:ph type="ftr" sz="quarter" idx="11"/>
+          </p:nvPr>
+        </p:nvSpPr>
+        <p:spPr/>
+        <p:txBody>
+          <a:bodyPr/>
+          <a:lstStyle/>
+          <a:p>
+            <a:r>
+              <a:rPr lang="en-US"/>
+              <a:t>Nodejs Basics</a:t>
+            </a:r>
+            <a:endParaRPr lang="en-US" dirty="0"/>
+          </a:p>
+        </p:txBody>
+      </p:sp>
+      <p:sp>
+        <p:nvSpPr>
+          <p:cNvPr id="5" name="Slide Number Placeholder 4">
+            <a:extLst>
+              <a:ext uri="{FF2B5EF4-FFF2-40B4-BE49-F238E27FC236}">
+                <a16:creationId xmlns:a16="http://schemas.microsoft.com/office/drawing/2014/main" id="{CCD92649-835D-4728-9D9D-ED9AE3CD862E}"/>
+              </a:ext>
+            </a:extLst>
+          </p:cNvPr>
+          <p:cNvSpPr>
+            <a:spLocks noGrp="1"/>
+          </p:cNvSpPr>
+          <p:nvPr>
+            <p:ph type="sldNum" sz="quarter" idx="12"/>
+          </p:nvPr>
+        </p:nvSpPr>
+        <p:spPr/>
+        <p:txBody>
+          <a:bodyPr/>
+          <a:lstStyle/>
+          <a:p>
+            <a:fld id="{3A98EE3D-8CD1-4C3F-BD1C-C98C9596463C}" type="slidenum">
+              <a:rPr lang="en-US" smtClean="0"/>
+              <a:t>4</a:t>
+            </a:fld>
+            <a:endParaRPr lang="en-US" dirty="0"/>
+          </a:p>
+        </p:txBody>
+      </p:sp>
+    </p:spTree>
+    <p:extLst>
+      <p:ext uri="{BB962C8B-B14F-4D97-AF65-F5344CB8AC3E}">
+        <p14:creationId xmlns:p14="http://schemas.microsoft.com/office/powerpoint/2010/main" val="3914557270"/>
+      </p:ext>
+    </p:extLst>
+  </p:cSld>
+  <p:clrMapOvr>
+    <a:masterClrMapping/>
+  </p:clrMapOvr>
+</p:sld>
+</file>
+
+<file path=ppt/slides/slide5.xml><?xml version="1.0" encoding="utf-8"?>
+<p:sld xmlns:a="http://schemas.openxmlformats.org/drawingml/2006/main" xmlns:r="http://schemas.openxmlformats.org/officeDocument/2006/relationships" xmlns:p="http://schemas.openxmlformats.org/presentationml/2006/main">
+  <p:cSld>
+    <p:spTree>
+      <p:nvGrpSpPr>
+        <p:cNvPr id="1" name=""/>
+        <p:cNvGrpSpPr/>
+        <p:nvPr/>
+      </p:nvGrpSpPr>
+      <p:grpSpPr>
+        <a:xfrm>
+          <a:off x="0" y="0"/>
+          <a:ext cx="0" cy="0"/>
+          <a:chOff x="0" y="0"/>
+          <a:chExt cx="0" cy="0"/>
+        </a:xfrm>
+      </p:grpSpPr>
+      <p:sp>
+        <p:nvSpPr>
+          <p:cNvPr id="2" name="Title 1">
+            <a:extLst>
+              <a:ext uri="{FF2B5EF4-FFF2-40B4-BE49-F238E27FC236}">
+                <a16:creationId xmlns:a16="http://schemas.microsoft.com/office/drawing/2014/main" id="{934ED11B-3751-43D3-84A4-882BE4266E6C}"/>
+              </a:ext>
+            </a:extLst>
+          </p:cNvPr>
+          <p:cNvSpPr>
+            <a:spLocks noGrp="1"/>
+          </p:cNvSpPr>
+          <p:nvPr>
+            <p:ph type="title"/>
+          </p:nvPr>
+        </p:nvSpPr>
+        <p:spPr/>
+        <p:txBody>
+          <a:bodyPr/>
+          <a:lstStyle/>
+          <a:p>
+            <a:r>
+              <a:rPr lang="en-US" dirty="0"/>
+              <a:t>Understanding objects</a:t>
+            </a:r>
+            <a:endParaRPr lang="fa-IR" dirty="0"/>
+          </a:p>
+        </p:txBody>
+      </p:sp>
+      <p:sp>
+        <p:nvSpPr>
+          <p:cNvPr id="3" name="Content Placeholder 2">
+            <a:extLst>
+              <a:ext uri="{FF2B5EF4-FFF2-40B4-BE49-F238E27FC236}">
+                <a16:creationId xmlns:a16="http://schemas.microsoft.com/office/drawing/2014/main" id="{EEBF293A-8111-4DAF-8D80-0E070CD2E3B5}"/>
+              </a:ext>
+            </a:extLst>
+          </p:cNvPr>
+          <p:cNvSpPr>
+            <a:spLocks noGrp="1"/>
+          </p:cNvSpPr>
+          <p:nvPr>
+            <p:ph idx="1"/>
+          </p:nvPr>
+        </p:nvSpPr>
+        <p:spPr/>
+        <p:txBody>
+          <a:bodyPr/>
+          <a:lstStyle/>
+          <a:p>
+            <a:r>
+              <a:rPr lang="en-US" dirty="0"/>
+              <a:t>What is heap?</a:t>
+            </a:r>
+          </a:p>
+          <a:p>
+            <a:r>
+              <a:rPr lang="en-US" dirty="0"/>
+              <a:t>Objects are instances of their specific classes</a:t>
+            </a:r>
+          </a:p>
+          <a:p>
+            <a:r>
+              <a:rPr lang="en-US" dirty="0"/>
+              <a:t>How about primitive types?</a:t>
+            </a:r>
+          </a:p>
+          <a:p>
+            <a:r>
+              <a:rPr lang="en-US" dirty="0"/>
+              <a:t>What happens when we instantiates a class</a:t>
+            </a:r>
+          </a:p>
+          <a:p>
+            <a:pPr lvl="1"/>
+            <a:endParaRPr lang="en-US" dirty="0"/>
+          </a:p>
+          <a:p>
+            <a:endParaRPr lang="fa-IR" dirty="0"/>
+          </a:p>
+        </p:txBody>
+      </p:sp>
+      <p:sp>
+        <p:nvSpPr>
+          <p:cNvPr id="4" name="Footer Placeholder 3">
+            <a:extLst>
+              <a:ext uri="{FF2B5EF4-FFF2-40B4-BE49-F238E27FC236}">
+                <a16:creationId xmlns:a16="http://schemas.microsoft.com/office/drawing/2014/main" id="{F0ADDF4E-C6D3-444D-B8CD-C290075B258A}"/>
+              </a:ext>
+            </a:extLst>
+          </p:cNvPr>
+          <p:cNvSpPr>
+            <a:spLocks noGrp="1"/>
+          </p:cNvSpPr>
+          <p:nvPr>
+            <p:ph type="ftr" sz="quarter" idx="11"/>
+          </p:nvPr>
+        </p:nvSpPr>
+        <p:spPr/>
+        <p:txBody>
+          <a:bodyPr/>
+          <a:lstStyle/>
+          <a:p>
+            <a:r>
+              <a:rPr lang="en-US"/>
+              <a:t>Nodejs Basics</a:t>
+            </a:r>
+            <a:endParaRPr lang="en-US" dirty="0"/>
+          </a:p>
+        </p:txBody>
+      </p:sp>
+      <p:sp>
+        <p:nvSpPr>
+          <p:cNvPr id="5" name="Slide Number Placeholder 4">
+            <a:extLst>
+              <a:ext uri="{FF2B5EF4-FFF2-40B4-BE49-F238E27FC236}">
+                <a16:creationId xmlns:a16="http://schemas.microsoft.com/office/drawing/2014/main" id="{5AC49D58-539D-4831-A8AE-ACAD65A16602}"/>
+              </a:ext>
+            </a:extLst>
+          </p:cNvPr>
+          <p:cNvSpPr>
+            <a:spLocks noGrp="1"/>
+          </p:cNvSpPr>
+          <p:nvPr>
+            <p:ph type="sldNum" sz="quarter" idx="12"/>
+          </p:nvPr>
+        </p:nvSpPr>
+        <p:spPr/>
+        <p:txBody>
+          <a:bodyPr/>
+          <a:lstStyle/>
+          <a:p>
+            <a:fld id="{3A98EE3D-8CD1-4C3F-BD1C-C98C9596463C}" type="slidenum">
+              <a:rPr lang="en-US" smtClean="0"/>
+              <a:t>5</a:t>
+            </a:fld>
+            <a:endParaRPr lang="en-US" dirty="0"/>
+          </a:p>
+        </p:txBody>
+      </p:sp>
+    </p:spTree>
+    <p:extLst>
+      <p:ext uri="{BB962C8B-B14F-4D97-AF65-F5344CB8AC3E}">
+        <p14:creationId xmlns:p14="http://schemas.microsoft.com/office/powerpoint/2010/main" val="3625772162"/>
+      </p:ext>
+    </p:extLst>
+  </p:cSld>
+  <p:clrMapOvr>
+    <a:masterClrMapping/>
+  </p:clrMapOvr>
+</p:sld>
+</file>
+
+<file path=ppt/slides/slide6.xml><?xml version="1.0" encoding="utf-8"?>
+<p:sld xmlns:a="http://schemas.openxmlformats.org/drawingml/2006/main" xmlns:r="http://schemas.openxmlformats.org/officeDocument/2006/relationships" xmlns:p="http://schemas.openxmlformats.org/presentationml/2006/main">
+  <p:cSld>
+    <p:spTree>
+      <p:nvGrpSpPr>
+        <p:cNvPr id="1" name=""/>
+        <p:cNvGrpSpPr/>
+        <p:nvPr/>
+      </p:nvGrpSpPr>
+      <p:grpSpPr>
+        <a:xfrm>
+          <a:off x="0" y="0"/>
+          <a:ext cx="0" cy="0"/>
+          <a:chOff x="0" y="0"/>
+          <a:chExt cx="0" cy="0"/>
+        </a:xfrm>
+      </p:grpSpPr>
+      <p:sp>
+        <p:nvSpPr>
+          <p:cNvPr id="4" name="Footer Placeholder 3">
+            <a:extLst>
+              <a:ext uri="{FF2B5EF4-FFF2-40B4-BE49-F238E27FC236}">
+                <a16:creationId xmlns:a16="http://schemas.microsoft.com/office/drawing/2014/main" id="{53504625-232A-4AC9-BCEC-6AD4CE013821}"/>
+              </a:ext>
+            </a:extLst>
+          </p:cNvPr>
+          <p:cNvSpPr>
+            <a:spLocks noGrp="1"/>
+          </p:cNvSpPr>
+          <p:nvPr>
+            <p:ph type="ftr" sz="quarter" idx="11"/>
+          </p:nvPr>
+        </p:nvSpPr>
+        <p:spPr/>
+        <p:txBody>
+          <a:bodyPr/>
+          <a:lstStyle/>
+          <a:p>
+            <a:r>
+              <a:rPr lang="en-US"/>
+              <a:t>Nodejs Basics</a:t>
+            </a:r>
+            <a:endParaRPr lang="en-US" dirty="0"/>
+          </a:p>
+        </p:txBody>
+      </p:sp>
+      <p:sp>
+        <p:nvSpPr>
+          <p:cNvPr id="5" name="Slide Number Placeholder 4">
+            <a:extLst>
+              <a:ext uri="{FF2B5EF4-FFF2-40B4-BE49-F238E27FC236}">
+                <a16:creationId xmlns:a16="http://schemas.microsoft.com/office/drawing/2014/main" id="{345021AE-38A5-40C4-8CA5-121082A4D7EA}"/>
+              </a:ext>
+            </a:extLst>
+          </p:cNvPr>
+          <p:cNvSpPr>
+            <a:spLocks noGrp="1"/>
+          </p:cNvSpPr>
+          <p:nvPr>
+            <p:ph type="sldNum" sz="quarter" idx="12"/>
+          </p:nvPr>
+        </p:nvSpPr>
+        <p:spPr/>
+        <p:txBody>
+          <a:bodyPr/>
+          <a:lstStyle/>
+          <a:p>
+            <a:fld id="{3A98EE3D-8CD1-4C3F-BD1C-C98C9596463C}" type="slidenum">
+              <a:rPr lang="en-US" smtClean="0"/>
+              <a:t>6</a:t>
+            </a:fld>
+            <a:endParaRPr lang="en-US" dirty="0"/>
+          </a:p>
+        </p:txBody>
+      </p:sp>
+      <p:pic>
+        <p:nvPicPr>
+          <p:cNvPr id="8" name="Picture 2" descr="Stack heap pointers explained">
+            <a:extLst>
+              <a:ext uri="{FF2B5EF4-FFF2-40B4-BE49-F238E27FC236}">
+                <a16:creationId xmlns:a16="http://schemas.microsoft.com/office/drawing/2014/main" id="{0A214334-53DE-43C0-9959-4D39157975DA}"/>
+              </a:ext>
+            </a:extLst>
+          </p:cNvPr>
+          <p:cNvPicPr>
+            <a:picLocks noChangeAspect="1" noChangeArrowheads="1"/>
+          </p:cNvPicPr>
+          <p:nvPr/>
+        </p:nvPicPr>
+        <p:blipFill>
+          <a:blip r:embed="rId2">
+            <a:extLst>
+              <a:ext uri="{28A0092B-C50C-407E-A947-70E740481C1C}">
+                <a14:useLocalDpi xmlns:a14="http://schemas.microsoft.com/office/drawing/2010/main" val="0"/>
+              </a:ext>
+            </a:extLst>
+          </a:blip>
+          <a:srcRect/>
+          <a:stretch>
+            <a:fillRect/>
+          </a:stretch>
+        </p:blipFill>
+        <p:spPr bwMode="auto">
+          <a:xfrm>
+            <a:off x="0" y="-47847"/>
+            <a:ext cx="12192000" cy="6446520"/>
+          </a:xfrm>
+          <a:prstGeom prst="rect">
+            <a:avLst/>
+          </a:prstGeom>
+          <a:noFill/>
+          <a:extLst>
+            <a:ext uri="{909E8E84-426E-40DD-AFC4-6F175D3DCCD1}">
+              <a14:hiddenFill xmlns:a14="http://schemas.microsoft.com/office/drawing/2010/main">
+                <a:solidFill>
+                  <a:srgbClr val="FFFFFF"/>
+                </a:solidFill>
+              </a14:hiddenFill>
+            </a:ext>
+          </a:extLst>
+        </p:spPr>
+      </p:pic>
+    </p:spTree>
+    <p:extLst>
+      <p:ext uri="{BB962C8B-B14F-4D97-AF65-F5344CB8AC3E}">
+        <p14:creationId xmlns:p14="http://schemas.microsoft.com/office/powerpoint/2010/main" val="1934882948"/>
+      </p:ext>
+    </p:extLst>
+  </p:cSld>
+  <p:clrMapOvr>
+    <a:masterClrMapping/>
+  </p:clrMapOvr>
+</p:sld>
+</file>
+
+<file path=ppt/slides/slide7.xml><?xml version="1.0" encoding="utf-8"?>
+<p:sld xmlns:a="http://schemas.openxmlformats.org/drawingml/2006/main" xmlns:r="http://schemas.openxmlformats.org/officeDocument/2006/relationships" xmlns:p="http://schemas.openxmlformats.org/presentationml/2006/main">
+  <p:cSld>
+    <p:spTree>
+      <p:nvGrpSpPr>
+        <p:cNvPr id="1" name=""/>
+        <p:cNvGrpSpPr/>
+        <p:nvPr/>
+      </p:nvGrpSpPr>
+      <p:grpSpPr>
+        <a:xfrm>
+          <a:off x="0" y="0"/>
+          <a:ext cx="0" cy="0"/>
+          <a:chOff x="0" y="0"/>
+          <a:chExt cx="0" cy="0"/>
+        </a:xfrm>
+      </p:grpSpPr>
+      <p:sp>
+        <p:nvSpPr>
+          <p:cNvPr id="2" name="Footer Placeholder 1">
+            <a:extLst>
+              <a:ext uri="{FF2B5EF4-FFF2-40B4-BE49-F238E27FC236}">
+                <a16:creationId xmlns:a16="http://schemas.microsoft.com/office/drawing/2014/main" id="{6A3DE2A1-7584-40B2-817E-14642043434D}"/>
+              </a:ext>
+            </a:extLst>
+          </p:cNvPr>
+          <p:cNvSpPr>
+            <a:spLocks noGrp="1"/>
+          </p:cNvSpPr>
+          <p:nvPr>
+            <p:ph type="ftr" sz="quarter" idx="11"/>
+          </p:nvPr>
+        </p:nvSpPr>
+        <p:spPr/>
+        <p:txBody>
+          <a:bodyPr/>
+          <a:lstStyle/>
+          <a:p>
+            <a:r>
+              <a:rPr lang="en-US"/>
+              <a:t>Nodejs Basics</a:t>
+            </a:r>
+            <a:endParaRPr lang="en-US" dirty="0"/>
+          </a:p>
+        </p:txBody>
+      </p:sp>
+      <p:sp>
+        <p:nvSpPr>
+          <p:cNvPr id="3" name="Slide Number Placeholder 2">
+            <a:extLst>
+              <a:ext uri="{FF2B5EF4-FFF2-40B4-BE49-F238E27FC236}">
+                <a16:creationId xmlns:a16="http://schemas.microsoft.com/office/drawing/2014/main" id="{356163EF-F22C-4524-9FB3-68686B21EE31}"/>
+              </a:ext>
+            </a:extLst>
+          </p:cNvPr>
+          <p:cNvSpPr>
+            <a:spLocks noGrp="1"/>
+          </p:cNvSpPr>
+          <p:nvPr>
+            <p:ph type="sldNum" sz="quarter" idx="12"/>
+          </p:nvPr>
+        </p:nvSpPr>
+        <p:spPr/>
+        <p:txBody>
+          <a:bodyPr/>
+          <a:lstStyle/>
+          <a:p>
+            <a:fld id="{3A98EE3D-8CD1-4C3F-BD1C-C98C9596463C}" type="slidenum">
+              <a:rPr lang="en-US" smtClean="0"/>
+              <a:t>7</a:t>
+            </a:fld>
+            <a:endParaRPr lang="en-US" dirty="0"/>
+          </a:p>
+        </p:txBody>
+      </p:sp>
+      <p:pic>
+        <p:nvPicPr>
+          <p:cNvPr id="5" name="Picture 4">
+            <a:extLst>
+              <a:ext uri="{FF2B5EF4-FFF2-40B4-BE49-F238E27FC236}">
+                <a16:creationId xmlns:a16="http://schemas.microsoft.com/office/drawing/2014/main" id="{A5BC4A92-E010-4901-A9BA-0AD9F34B3791}"/>
+              </a:ext>
+            </a:extLst>
+          </p:cNvPr>
+          <p:cNvPicPr>
+            <a:picLocks noChangeAspect="1"/>
+          </p:cNvPicPr>
+          <p:nvPr/>
+        </p:nvPicPr>
+        <p:blipFill>
+          <a:blip r:embed="rId2"/>
+          <a:stretch>
+            <a:fillRect/>
+          </a:stretch>
+        </p:blipFill>
+        <p:spPr>
+          <a:xfrm>
+            <a:off x="141767" y="6648"/>
+            <a:ext cx="11908465" cy="6318298"/>
+          </a:xfrm>
+          <a:prstGeom prst="rect">
+            <a:avLst/>
+          </a:prstGeom>
+        </p:spPr>
+      </p:pic>
+    </p:spTree>
+    <p:extLst>
+      <p:ext uri="{BB962C8B-B14F-4D97-AF65-F5344CB8AC3E}">
+        <p14:creationId xmlns:p14="http://schemas.microsoft.com/office/powerpoint/2010/main" val="2409477060"/>
       </p:ext>
     </p:extLst>
   </p:cSld>

</xml_diff>

<commit_message>
feat: new session oop 03
</commit_message>
<xml_diff>
--- a/oop/oop-01.pptx
+++ b/oop/oop-01.pptx
@@ -209,7 +209,7 @@
           <a:p>
             <a:fld id="{9B9ECB28-6A22-4037-9487-F3F739F744D6}" type="datetimeFigureOut">
               <a:rPr lang="en-US" smtClean="0"/>
-              <a:t>12/4/2021</a:t>
+              <a:t>12/6/2021</a:t>
             </a:fld>
             <a:endParaRPr lang="en-US"/>
           </a:p>
@@ -838,7 +838,7 @@
           <a:p>
             <a:fld id="{19B6F524-99F3-4BEA-ACD7-976EF4D36657}" type="datetime1">
               <a:rPr lang="en-US" smtClean="0"/>
-              <a:t>12/4/2021</a:t>
+              <a:t>12/6/2021</a:t>
             </a:fld>
             <a:endParaRPr lang="en-US" dirty="0"/>
           </a:p>
@@ -1147,7 +1147,7 @@
           <a:p>
             <a:fld id="{2145C3A9-05D9-428D-9788-A7F14838F6F9}" type="datetime1">
               <a:rPr lang="en-US" smtClean="0"/>
-              <a:t>12/4/2021</a:t>
+              <a:t>12/6/2021</a:t>
             </a:fld>
             <a:endParaRPr lang="en-US" dirty="0"/>
           </a:p>
@@ -1345,7 +1345,7 @@
           <a:p>
             <a:fld id="{82C701FB-B03E-4981-A9F8-99B474DD173A}" type="datetime1">
               <a:rPr lang="en-US" smtClean="0"/>
-              <a:t>12/4/2021</a:t>
+              <a:t>12/6/2021</a:t>
             </a:fld>
             <a:endParaRPr lang="en-US" dirty="0"/>
           </a:p>
@@ -1612,7 +1612,7 @@
           <a:p>
             <a:fld id="{7A7E8EF3-CBF7-4EB9-B6E5-3754574E3433}" type="datetime1">
               <a:rPr lang="en-US" smtClean="0"/>
-              <a:t>12/4/2021</a:t>
+              <a:t>12/6/2021</a:t>
             </a:fld>
             <a:endParaRPr lang="en-US" dirty="0"/>
           </a:p>
@@ -2052,7 +2052,7 @@
           <a:p>
             <a:fld id="{DA8A4A96-31AC-487C-9F15-1822D58542B7}" type="datetime1">
               <a:rPr lang="en-US" smtClean="0"/>
-              <a:t>12/4/2021</a:t>
+              <a:t>12/6/2021</a:t>
             </a:fld>
             <a:endParaRPr lang="en-US" dirty="0"/>
           </a:p>
@@ -2593,7 +2593,7 @@
           <a:p>
             <a:fld id="{FBBF9546-09C4-4F24-A284-5B81FF8659B4}" type="datetime1">
               <a:rPr lang="en-US" smtClean="0"/>
-              <a:t>12/4/2021</a:t>
+              <a:t>12/6/2021</a:t>
             </a:fld>
             <a:endParaRPr lang="en-US" dirty="0"/>
           </a:p>
@@ -3479,7 +3479,7 @@
           <a:p>
             <a:fld id="{5BF4405D-15A5-450B-B053-484859B9C8F7}" type="datetime1">
               <a:rPr lang="en-US" smtClean="0"/>
-              <a:t>12/4/2021</a:t>
+              <a:t>12/6/2021</a:t>
             </a:fld>
             <a:endParaRPr lang="en-US" dirty="0"/>
           </a:p>
@@ -3653,7 +3653,7 @@
           <a:p>
             <a:fld id="{E0366559-EC21-40C1-8A65-9A3B4EA78391}" type="datetime1">
               <a:rPr lang="en-US" smtClean="0"/>
-              <a:t>12/4/2021</a:t>
+              <a:t>12/6/2021</a:t>
             </a:fld>
             <a:endParaRPr lang="en-US" dirty="0"/>
           </a:p>
@@ -3841,7 +3841,7 @@
           <a:p>
             <a:fld id="{4F09CA92-695C-4FFA-8E37-4D2C288BCC04}" type="datetime1">
               <a:rPr lang="en-US" smtClean="0"/>
-              <a:t>12/4/2021</a:t>
+              <a:t>12/6/2021</a:t>
             </a:fld>
             <a:endParaRPr lang="en-US" dirty="0"/>
           </a:p>
@@ -4015,7 +4015,7 @@
           <a:p>
             <a:fld id="{CA551262-FC07-4FE4-9221-F72F7D4F209A}" type="datetime1">
               <a:rPr lang="en-US" smtClean="0"/>
-              <a:t>12/4/2021</a:t>
+              <a:t>12/6/2021</a:t>
             </a:fld>
             <a:endParaRPr lang="en-US" dirty="0"/>
           </a:p>
@@ -4263,7 +4263,7 @@
           <a:p>
             <a:fld id="{46A321E4-8899-4F7D-BEB1-BD52626ABD8D}" type="datetime1">
               <a:rPr lang="en-US" smtClean="0"/>
-              <a:t>12/4/2021</a:t>
+              <a:t>12/6/2021</a:t>
             </a:fld>
             <a:endParaRPr lang="en-US" dirty="0"/>
           </a:p>
@@ -4509,7 +4509,7 @@
           <a:p>
             <a:fld id="{B53F6DFA-8A0E-4513-867D-18B9AA66B23C}" type="datetime1">
               <a:rPr lang="en-US" smtClean="0"/>
-              <a:t>12/4/2021</a:t>
+              <a:t>12/6/2021</a:t>
             </a:fld>
             <a:endParaRPr lang="en-US" dirty="0"/>
           </a:p>
@@ -4996,7 +4996,7 @@
           <a:p>
             <a:fld id="{154283A7-B9AC-454B-A468-44B75A398B49}" type="datetime1">
               <a:rPr lang="en-US" smtClean="0"/>
-              <a:t>12/4/2021</a:t>
+              <a:t>12/6/2021</a:t>
             </a:fld>
             <a:endParaRPr lang="en-US" dirty="0"/>
           </a:p>
@@ -5118,7 +5118,7 @@
           <a:p>
             <a:fld id="{A3F8184D-DEDD-48A0-9ACA-5F6ED9EFE5B8}" type="datetime1">
               <a:rPr lang="en-US" smtClean="0"/>
-              <a:t>12/4/2021</a:t>
+              <a:t>12/6/2021</a:t>
             </a:fld>
             <a:endParaRPr lang="en-US" dirty="0"/>
           </a:p>
@@ -5217,7 +5217,7 @@
           <a:p>
             <a:fld id="{BF38AC0E-F520-48F3-BA14-8BAB82D735FB}" type="datetime1">
               <a:rPr lang="en-US" smtClean="0"/>
-              <a:t>12/4/2021</a:t>
+              <a:t>12/6/2021</a:t>
             </a:fld>
             <a:endParaRPr lang="en-US" dirty="0"/>
           </a:p>
@@ -5476,7 +5476,7 @@
           <a:p>
             <a:fld id="{317D0F2A-2724-4AD4-BF4C-A7B1910D9412}" type="datetime1">
               <a:rPr lang="en-US" smtClean="0"/>
-              <a:t>12/4/2021</a:t>
+              <a:t>12/6/2021</a:t>
             </a:fld>
             <a:endParaRPr lang="en-US" dirty="0"/>
           </a:p>
@@ -5787,7 +5787,7 @@
           <a:p>
             <a:fld id="{9A0B82A5-4A21-4F82-91DB-989CE997E82E}" type="datetime1">
               <a:rPr lang="en-US" smtClean="0"/>
-              <a:t>12/4/2021</a:t>
+              <a:t>12/6/2021</a:t>
             </a:fld>
             <a:endParaRPr lang="en-US" dirty="0"/>
           </a:p>
@@ -6024,7 +6024,7 @@
           <a:p>
             <a:fld id="{01BFEF8A-AE08-4951-B923-589F814B0C31}" type="datetime1">
               <a:rPr lang="en-US" smtClean="0"/>
-              <a:t>12/4/2021</a:t>
+              <a:t>12/6/2021</a:t>
             </a:fld>
             <a:endParaRPr lang="en-US" dirty="0"/>
           </a:p>
@@ -7673,6 +7673,16 @@
           </a:p>
           <a:p>
             <a:r>
+              <a:rPr lang="en-US">
+                <a:solidFill>
+                  <a:schemeClr val="tx1">
+                    <a:lumMod val="50000"/>
+                  </a:schemeClr>
+                </a:solidFill>
+              </a:rPr>
+              <a:t>Static</a:t>
+            </a:r>
+            <a:r>
               <a:rPr lang="en-US" dirty="0">
                 <a:solidFill>
                   <a:schemeClr val="tx1">
@@ -7680,7 +7690,7 @@
                   </a:schemeClr>
                 </a:solidFill>
               </a:rPr>
-              <a:t>Constructor, Static, Parameter, and Read-only properties.</a:t>
+              <a:t>, Parameter, and Read-only properties.</a:t>
             </a:r>
           </a:p>
           <a:p>

</xml_diff>